<commit_message>
code style improvements for pusblish
</commit_message>
<xml_diff>
--- a/SequencePatterns/SequenceLogo/Sequence logo.pptx
+++ b/SequencePatterns/SequenceLogo/Sequence logo.pptx
@@ -8,6 +8,8 @@
     <p:sldId id="256" r:id="rId2"/>
     <p:sldId id="257" r:id="rId3"/>
     <p:sldId id="258" r:id="rId4"/>
+    <p:sldId id="259" r:id="rId5"/>
+    <p:sldId id="260" r:id="rId6"/>
   </p:sldIdLst>
   <p:sldSz cx="12192000" cy="6858000"/>
   <p:notesSz cx="6858000" cy="9144000"/>
@@ -108,7 +110,18 @@
   </p:defaultTextStyle>
   <p:extLst>
     <p:ext uri="{EFAFB233-063F-42B5-8137-9DF3F51BA10A}">
-      <p15:sldGuideLst xmlns:p15="http://schemas.microsoft.com/office/powerpoint/2012/main"/>
+      <p15:sldGuideLst xmlns:p15="http://schemas.microsoft.com/office/powerpoint/2012/main">
+        <p15:guide id="1" orient="horz" pos="2160" userDrawn="1">
+          <p15:clr>
+            <a:srgbClr val="A4A3A4"/>
+          </p15:clr>
+        </p15:guide>
+        <p15:guide id="2" pos="3840" userDrawn="1">
+          <p15:clr>
+            <a:srgbClr val="A4A3A4"/>
+          </p15:clr>
+        </p15:guide>
+      </p15:sldGuideLst>
     </p:ext>
   </p:extLst>
 </p:presentation>
@@ -5292,8 +5305,8 @@
           <a:chExt cx="0" cy="0"/>
         </a:xfrm>
       </p:grpSpPr>
-      <mc:AlternateContent xmlns:mc="http://schemas.openxmlformats.org/markup-compatibility/2006">
-        <mc:Choice xmlns:a14="http://schemas.microsoft.com/office/drawing/2010/main" Requires="a14">
+      <mc:AlternateContent xmlns:mc="http://schemas.openxmlformats.org/markup-compatibility/2006" xmlns:a14="http://schemas.microsoft.com/office/drawing/2010/main">
+        <mc:Choice Requires="a14">
           <p:sp>
             <p:nvSpPr>
               <p:cNvPr id="4" name="TextBox 3"/>
@@ -5316,6 +5329,7 @@
               </a:bodyPr>
               <a:lstStyle/>
               <a:p>
+                <a:pPr/>
                 <a14:m>
                   <m:oMathPara xmlns:m="http://schemas.openxmlformats.org/officeDocument/2006/math">
                     <m:oMathParaPr>
@@ -5457,7 +5471,7 @@
             </p:txBody>
           </p:sp>
         </mc:Choice>
-        <mc:Fallback>
+        <mc:Fallback xmlns="">
           <p:sp>
             <p:nvSpPr>
               <p:cNvPr id="4" name="TextBox 3"/>
@@ -5496,8 +5510,8 @@
           </p:sp>
         </mc:Fallback>
       </mc:AlternateContent>
-      <mc:AlternateContent xmlns:mc="http://schemas.openxmlformats.org/markup-compatibility/2006">
-        <mc:Choice xmlns:a14="http://schemas.microsoft.com/office/drawing/2010/main" Requires="a14">
+      <mc:AlternateContent xmlns:mc="http://schemas.openxmlformats.org/markup-compatibility/2006" xmlns:a14="http://schemas.microsoft.com/office/drawing/2010/main">
+        <mc:Choice Requires="a14">
           <p:sp>
             <p:nvSpPr>
               <p:cNvPr id="5" name="TextBox 4"/>
@@ -5520,6 +5534,7 @@
               </a:bodyPr>
               <a:lstStyle/>
               <a:p>
+                <a:pPr/>
                 <a14:m>
                   <m:oMathPara xmlns:m="http://schemas.openxmlformats.org/officeDocument/2006/math">
                     <m:oMathParaPr>
@@ -5629,7 +5644,7 @@
             </p:txBody>
           </p:sp>
         </mc:Choice>
-        <mc:Fallback>
+        <mc:Fallback xmlns="">
           <p:sp>
             <p:nvSpPr>
               <p:cNvPr id="5" name="TextBox 4"/>
@@ -5668,8 +5683,8 @@
           </p:sp>
         </mc:Fallback>
       </mc:AlternateContent>
-      <mc:AlternateContent xmlns:mc="http://schemas.openxmlformats.org/markup-compatibility/2006">
-        <mc:Choice xmlns:a14="http://schemas.microsoft.com/office/drawing/2010/main" Requires="a14">
+      <mc:AlternateContent xmlns:mc="http://schemas.openxmlformats.org/markup-compatibility/2006" xmlns:a14="http://schemas.microsoft.com/office/drawing/2010/main">
+        <mc:Choice Requires="a14">
           <p:sp>
             <p:nvSpPr>
               <p:cNvPr id="6" name="TextBox 5"/>
@@ -5692,6 +5707,7 @@
               </a:bodyPr>
               <a:lstStyle/>
               <a:p>
+                <a:pPr/>
                 <a14:m>
                   <m:oMathPara xmlns:m="http://schemas.openxmlformats.org/officeDocument/2006/math">
                     <m:oMathParaPr>
@@ -5908,7 +5924,7 @@
             </p:txBody>
           </p:sp>
         </mc:Choice>
-        <mc:Fallback>
+        <mc:Fallback xmlns="">
           <p:sp>
             <p:nvSpPr>
               <p:cNvPr id="6" name="TextBox 5"/>
@@ -5951,6 +5967,1344 @@
     <p:extLst>
       <p:ext uri="{BB962C8B-B14F-4D97-AF65-F5344CB8AC3E}">
         <p14:creationId xmlns:p14="http://schemas.microsoft.com/office/powerpoint/2010/main" val="2377427846"/>
+      </p:ext>
+    </p:extLst>
+  </p:cSld>
+  <p:clrMapOvr>
+    <a:masterClrMapping/>
+  </p:clrMapOvr>
+</p:sld>
+</file>
+
+<file path=ppt/slides/slide4.xml><?xml version="1.0" encoding="utf-8"?>
+<p:sld xmlns:a="http://schemas.openxmlformats.org/drawingml/2006/main" xmlns:r="http://schemas.openxmlformats.org/officeDocument/2006/relationships" xmlns:p="http://schemas.openxmlformats.org/presentationml/2006/main">
+  <p:cSld>
+    <p:spTree>
+      <p:nvGrpSpPr>
+        <p:cNvPr id="1" name=""/>
+        <p:cNvGrpSpPr/>
+        <p:nvPr/>
+      </p:nvGrpSpPr>
+      <p:grpSpPr>
+        <a:xfrm>
+          <a:off x="0" y="0"/>
+          <a:ext cx="0" cy="0"/>
+          <a:chOff x="0" y="0"/>
+          <a:chExt cx="0" cy="0"/>
+        </a:xfrm>
+      </p:grpSpPr>
+      <p:grpSp>
+        <p:nvGrpSpPr>
+          <p:cNvPr id="22" name="Group 21"/>
+          <p:cNvGrpSpPr/>
+          <p:nvPr/>
+        </p:nvGrpSpPr>
+        <p:grpSpPr>
+          <a:xfrm>
+            <a:off x="3968858" y="268476"/>
+            <a:ext cx="8146023" cy="3330154"/>
+            <a:chOff x="1973804" y="2365131"/>
+            <a:chExt cx="8146023" cy="3330154"/>
+          </a:xfrm>
+        </p:grpSpPr>
+        <p:pic>
+          <p:nvPicPr>
+            <p:cNvPr id="5" name="Picture 4"/>
+            <p:cNvPicPr>
+              <a:picLocks noChangeAspect="1"/>
+            </p:cNvPicPr>
+            <p:nvPr/>
+          </p:nvPicPr>
+          <p:blipFill>
+            <a:blip r:embed="rId2">
+              <a:extLst>
+                <a:ext uri="{28A0092B-C50C-407E-A947-70E740481C1C}">
+                  <a14:useLocalDpi xmlns:a14="http://schemas.microsoft.com/office/drawing/2010/main" val="0"/>
+                </a:ext>
+              </a:extLst>
+            </a:blip>
+            <a:stretch>
+              <a:fillRect/>
+            </a:stretch>
+          </p:blipFill>
+          <p:spPr>
+            <a:xfrm>
+              <a:off x="2655277" y="2487490"/>
+              <a:ext cx="7464550" cy="2014172"/>
+            </a:xfrm>
+            <a:prstGeom prst="rect">
+              <a:avLst/>
+            </a:prstGeom>
+          </p:spPr>
+        </p:pic>
+        <p:cxnSp>
+          <p:nvCxnSpPr>
+            <p:cNvPr id="7" name="Straight Arrow Connector 6"/>
+            <p:cNvCxnSpPr/>
+            <p:nvPr/>
+          </p:nvCxnSpPr>
+          <p:spPr>
+            <a:xfrm>
+              <a:off x="2435469" y="2365131"/>
+              <a:ext cx="8793" cy="2136531"/>
+            </a:xfrm>
+            <a:prstGeom prst="straightConnector1">
+              <a:avLst/>
+            </a:prstGeom>
+            <a:ln w="76200">
+              <a:solidFill>
+                <a:srgbClr val="FF0000"/>
+              </a:solidFill>
+              <a:headEnd type="arrow"/>
+              <a:tailEnd type="arrow"/>
+            </a:ln>
+          </p:spPr>
+          <p:style>
+            <a:lnRef idx="1">
+              <a:schemeClr val="accent1"/>
+            </a:lnRef>
+            <a:fillRef idx="0">
+              <a:schemeClr val="accent1"/>
+            </a:fillRef>
+            <a:effectRef idx="0">
+              <a:schemeClr val="accent1"/>
+            </a:effectRef>
+            <a:fontRef idx="minor">
+              <a:schemeClr val="tx1"/>
+            </a:fontRef>
+          </p:style>
+        </p:cxnSp>
+        <p:sp>
+          <p:nvSpPr>
+            <p:cNvPr id="11" name="TextBox 10"/>
+            <p:cNvSpPr txBox="1"/>
+            <p:nvPr/>
+          </p:nvSpPr>
+          <p:spPr>
+            <a:xfrm>
+              <a:off x="1973804" y="3276086"/>
+              <a:ext cx="461665" cy="436979"/>
+            </a:xfrm>
+            <a:prstGeom prst="rect">
+              <a:avLst/>
+            </a:prstGeom>
+            <a:noFill/>
+          </p:spPr>
+          <p:txBody>
+            <a:bodyPr vert="vert270" wrap="none" rtlCol="0">
+              <a:spAutoFit/>
+            </a:bodyPr>
+            <a:lstStyle/>
+            <a:p>
+              <a:r>
+                <a:rPr lang="en-US" altLang="zh-CN" dirty="0" smtClean="0"/>
+                <a:t>Bits</a:t>
+              </a:r>
+              <a:endParaRPr lang="en-US" dirty="0"/>
+            </a:p>
+          </p:txBody>
+        </p:sp>
+        <p:cxnSp>
+          <p:nvCxnSpPr>
+            <p:cNvPr id="13" name="Straight Arrow Connector 12"/>
+            <p:cNvCxnSpPr/>
+            <p:nvPr/>
+          </p:nvCxnSpPr>
+          <p:spPr>
+            <a:xfrm flipV="1">
+              <a:off x="4230254" y="4581825"/>
+              <a:ext cx="267853" cy="522919"/>
+            </a:xfrm>
+            <a:prstGeom prst="straightConnector1">
+              <a:avLst/>
+            </a:prstGeom>
+            <a:ln w="50800">
+              <a:tailEnd type="triangle"/>
+            </a:ln>
+          </p:spPr>
+          <p:style>
+            <a:lnRef idx="1">
+              <a:schemeClr val="accent1"/>
+            </a:lnRef>
+            <a:fillRef idx="0">
+              <a:schemeClr val="accent1"/>
+            </a:fillRef>
+            <a:effectRef idx="0">
+              <a:schemeClr val="accent1"/>
+            </a:effectRef>
+            <a:fontRef idx="minor">
+              <a:schemeClr val="tx1"/>
+            </a:fontRef>
+          </p:style>
+        </p:cxnSp>
+        <p:sp>
+          <p:nvSpPr>
+            <p:cNvPr id="15" name="TextBox 14"/>
+            <p:cNvSpPr txBox="1"/>
+            <p:nvPr/>
+          </p:nvSpPr>
+          <p:spPr>
+            <a:xfrm>
+              <a:off x="3288145" y="4791295"/>
+              <a:ext cx="1430071" cy="369332"/>
+            </a:xfrm>
+            <a:prstGeom prst="rect">
+              <a:avLst/>
+            </a:prstGeom>
+            <a:noFill/>
+          </p:spPr>
+          <p:txBody>
+            <a:bodyPr wrap="none" rtlCol="0">
+              <a:spAutoFit/>
+            </a:bodyPr>
+            <a:lstStyle/>
+            <a:p>
+              <a:r>
+                <a:rPr lang="en-US" dirty="0" smtClean="0"/>
+                <a:t>Residue Site i</a:t>
+              </a:r>
+              <a:endParaRPr lang="en-US" dirty="0"/>
+            </a:p>
+          </p:txBody>
+        </p:sp>
+        <p:cxnSp>
+          <p:nvCxnSpPr>
+            <p:cNvPr id="16" name="Straight Arrow Connector 15"/>
+            <p:cNvCxnSpPr/>
+            <p:nvPr/>
+          </p:nvCxnSpPr>
+          <p:spPr>
+            <a:xfrm flipH="1" flipV="1">
+              <a:off x="2444262" y="5236895"/>
+              <a:ext cx="7514741" cy="12790"/>
+            </a:xfrm>
+            <a:prstGeom prst="straightConnector1">
+              <a:avLst/>
+            </a:prstGeom>
+            <a:ln w="76200">
+              <a:solidFill>
+                <a:srgbClr val="FF0000"/>
+              </a:solidFill>
+              <a:headEnd type="arrow"/>
+              <a:tailEnd type="arrow"/>
+            </a:ln>
+          </p:spPr>
+          <p:style>
+            <a:lnRef idx="1">
+              <a:schemeClr val="accent1"/>
+            </a:lnRef>
+            <a:fillRef idx="0">
+              <a:schemeClr val="accent1"/>
+            </a:fillRef>
+            <a:effectRef idx="0">
+              <a:schemeClr val="accent1"/>
+            </a:effectRef>
+            <a:fontRef idx="minor">
+              <a:schemeClr val="tx1"/>
+            </a:fontRef>
+          </p:style>
+        </p:cxnSp>
+        <p:sp>
+          <p:nvSpPr>
+            <p:cNvPr id="21" name="TextBox 20"/>
+            <p:cNvSpPr txBox="1"/>
+            <p:nvPr/>
+          </p:nvSpPr>
+          <p:spPr>
+            <a:xfrm>
+              <a:off x="5311137" y="5325953"/>
+              <a:ext cx="1569725" cy="369332"/>
+            </a:xfrm>
+            <a:prstGeom prst="rect">
+              <a:avLst/>
+            </a:prstGeom>
+            <a:noFill/>
+          </p:spPr>
+          <p:txBody>
+            <a:bodyPr wrap="none" rtlCol="0">
+              <a:spAutoFit/>
+            </a:bodyPr>
+            <a:lstStyle/>
+            <a:p>
+              <a:r>
+                <a:rPr lang="en-US" dirty="0" err="1" smtClean="0">
+                  <a:solidFill>
+                    <a:schemeClr val="accent1">
+                      <a:lumMod val="75000"/>
+                    </a:schemeClr>
+                  </a:solidFill>
+                </a:rPr>
+                <a:t>DrawingModel</a:t>
+              </a:r>
+              <a:endParaRPr lang="en-US" dirty="0">
+                <a:solidFill>
+                  <a:schemeClr val="accent1">
+                    <a:lumMod val="75000"/>
+                  </a:schemeClr>
+                </a:solidFill>
+              </a:endParaRPr>
+            </a:p>
+          </p:txBody>
+        </p:sp>
+      </p:grpSp>
+    </p:spTree>
+    <p:extLst>
+      <p:ext uri="{BB962C8B-B14F-4D97-AF65-F5344CB8AC3E}">
+        <p14:creationId xmlns:p14="http://schemas.microsoft.com/office/powerpoint/2010/main" val="54980096"/>
+      </p:ext>
+    </p:extLst>
+  </p:cSld>
+  <p:clrMapOvr>
+    <a:masterClrMapping/>
+  </p:clrMapOvr>
+</p:sld>
+</file>
+
+<file path=ppt/slides/slide5.xml><?xml version="1.0" encoding="utf-8"?>
+<p:sld xmlns:a="http://schemas.openxmlformats.org/drawingml/2006/main" xmlns:r="http://schemas.openxmlformats.org/officeDocument/2006/relationships" xmlns:p="http://schemas.openxmlformats.org/presentationml/2006/main">
+  <p:cSld>
+    <p:spTree>
+      <p:nvGrpSpPr>
+        <p:cNvPr id="1" name=""/>
+        <p:cNvGrpSpPr/>
+        <p:nvPr/>
+      </p:nvGrpSpPr>
+      <p:grpSpPr>
+        <a:xfrm>
+          <a:off x="0" y="0"/>
+          <a:ext cx="0" cy="0"/>
+          <a:chOff x="0" y="0"/>
+          <a:chExt cx="0" cy="0"/>
+        </a:xfrm>
+      </p:grpSpPr>
+      <p:grpSp>
+        <p:nvGrpSpPr>
+          <p:cNvPr id="17" name="Group 16"/>
+          <p:cNvGrpSpPr/>
+          <p:nvPr/>
+        </p:nvGrpSpPr>
+        <p:grpSpPr>
+          <a:xfrm>
+            <a:off x="6951667" y="131147"/>
+            <a:ext cx="4098686" cy="6595706"/>
+            <a:chOff x="3432613" y="78509"/>
+            <a:chExt cx="4098686" cy="6595706"/>
+          </a:xfrm>
+        </p:grpSpPr>
+        <p:pic>
+          <p:nvPicPr>
+            <p:cNvPr id="4" name="Picture 3"/>
+            <p:cNvPicPr>
+              <a:picLocks noChangeAspect="1"/>
+            </p:cNvPicPr>
+            <p:nvPr/>
+          </p:nvPicPr>
+          <p:blipFill>
+            <a:blip r:embed="rId2">
+              <a:extLst>
+                <a:ext uri="{28A0092B-C50C-407E-A947-70E740481C1C}">
+                  <a14:useLocalDpi xmlns:a14="http://schemas.microsoft.com/office/drawing/2010/main" val="0"/>
+                </a:ext>
+              </a:extLst>
+            </a:blip>
+            <a:stretch>
+              <a:fillRect/>
+            </a:stretch>
+          </p:blipFill>
+          <p:spPr>
+            <a:xfrm>
+              <a:off x="6197601" y="78509"/>
+              <a:ext cx="1333698" cy="5703455"/>
+            </a:xfrm>
+            <a:prstGeom prst="rect">
+              <a:avLst/>
+            </a:prstGeom>
+          </p:spPr>
+        </p:pic>
+        <p:cxnSp>
+          <p:nvCxnSpPr>
+            <p:cNvPr id="5" name="Straight Arrow Connector 4"/>
+            <p:cNvCxnSpPr/>
+            <p:nvPr/>
+          </p:nvCxnSpPr>
+          <p:spPr>
+            <a:xfrm flipV="1">
+              <a:off x="6063674" y="5781964"/>
+              <a:ext cx="267853" cy="522919"/>
+            </a:xfrm>
+            <a:prstGeom prst="straightConnector1">
+              <a:avLst/>
+            </a:prstGeom>
+            <a:ln w="50800">
+              <a:tailEnd type="triangle"/>
+            </a:ln>
+          </p:spPr>
+          <p:style>
+            <a:lnRef idx="1">
+              <a:schemeClr val="accent1"/>
+            </a:lnRef>
+            <a:fillRef idx="0">
+              <a:schemeClr val="accent1"/>
+            </a:fillRef>
+            <a:effectRef idx="0">
+              <a:schemeClr val="accent1"/>
+            </a:effectRef>
+            <a:fontRef idx="minor">
+              <a:schemeClr val="tx1"/>
+            </a:fontRef>
+          </p:style>
+        </p:cxnSp>
+        <p:sp>
+          <p:nvSpPr>
+            <p:cNvPr id="6" name="TextBox 5"/>
+            <p:cNvSpPr txBox="1"/>
+            <p:nvPr/>
+          </p:nvSpPr>
+          <p:spPr>
+            <a:xfrm>
+              <a:off x="5602265" y="6304883"/>
+              <a:ext cx="922817" cy="369332"/>
+            </a:xfrm>
+            <a:prstGeom prst="rect">
+              <a:avLst/>
+            </a:prstGeom>
+            <a:noFill/>
+          </p:spPr>
+          <p:txBody>
+            <a:bodyPr wrap="none" rtlCol="0">
+              <a:spAutoFit/>
+            </a:bodyPr>
+            <a:lstStyle/>
+            <a:p>
+              <a:r>
+                <a:rPr lang="en-US" dirty="0" smtClean="0">
+                  <a:solidFill>
+                    <a:schemeClr val="accent1">
+                      <a:lumMod val="75000"/>
+                    </a:schemeClr>
+                  </a:solidFill>
+                </a:rPr>
+                <a:t>Residue</a:t>
+              </a:r>
+              <a:endParaRPr lang="en-US" dirty="0">
+                <a:solidFill>
+                  <a:schemeClr val="accent1">
+                    <a:lumMod val="75000"/>
+                  </a:schemeClr>
+                </a:solidFill>
+              </a:endParaRPr>
+            </a:p>
+          </p:txBody>
+        </p:sp>
+        <p:cxnSp>
+          <p:nvCxnSpPr>
+            <p:cNvPr id="8" name="Straight Arrow Connector 7"/>
+            <p:cNvCxnSpPr/>
+            <p:nvPr/>
+          </p:nvCxnSpPr>
+          <p:spPr>
+            <a:xfrm flipV="1">
+              <a:off x="5080000" y="1971965"/>
+              <a:ext cx="1143000" cy="696812"/>
+            </a:xfrm>
+            <a:prstGeom prst="straightConnector1">
+              <a:avLst/>
+            </a:prstGeom>
+            <a:ln w="50800">
+              <a:tailEnd type="triangle"/>
+            </a:ln>
+          </p:spPr>
+          <p:style>
+            <a:lnRef idx="1">
+              <a:schemeClr val="accent1"/>
+            </a:lnRef>
+            <a:fillRef idx="0">
+              <a:schemeClr val="accent1"/>
+            </a:fillRef>
+            <a:effectRef idx="0">
+              <a:schemeClr val="accent1"/>
+            </a:effectRef>
+            <a:fontRef idx="minor">
+              <a:schemeClr val="tx1"/>
+            </a:fontRef>
+          </p:style>
+        </p:cxnSp>
+        <p:cxnSp>
+          <p:nvCxnSpPr>
+            <p:cNvPr id="10" name="Straight Arrow Connector 9"/>
+            <p:cNvCxnSpPr/>
+            <p:nvPr/>
+          </p:nvCxnSpPr>
+          <p:spPr>
+            <a:xfrm>
+              <a:off x="5015345" y="2827839"/>
+              <a:ext cx="1080655" cy="1136072"/>
+            </a:xfrm>
+            <a:prstGeom prst="straightConnector1">
+              <a:avLst/>
+            </a:prstGeom>
+            <a:ln w="50800">
+              <a:tailEnd type="triangle"/>
+            </a:ln>
+          </p:spPr>
+          <p:style>
+            <a:lnRef idx="1">
+              <a:schemeClr val="accent1"/>
+            </a:lnRef>
+            <a:fillRef idx="0">
+              <a:schemeClr val="accent1"/>
+            </a:fillRef>
+            <a:effectRef idx="0">
+              <a:schemeClr val="accent1"/>
+            </a:effectRef>
+            <a:fontRef idx="minor">
+              <a:schemeClr val="tx1"/>
+            </a:fontRef>
+          </p:style>
+        </p:cxnSp>
+        <p:cxnSp>
+          <p:nvCxnSpPr>
+            <p:cNvPr id="13" name="Straight Arrow Connector 12"/>
+            <p:cNvCxnSpPr/>
+            <p:nvPr/>
+          </p:nvCxnSpPr>
+          <p:spPr>
+            <a:xfrm>
+              <a:off x="5015345" y="3011055"/>
+              <a:ext cx="1182255" cy="1911927"/>
+            </a:xfrm>
+            <a:prstGeom prst="straightConnector1">
+              <a:avLst/>
+            </a:prstGeom>
+            <a:ln w="50800">
+              <a:tailEnd type="triangle"/>
+            </a:ln>
+          </p:spPr>
+          <p:style>
+            <a:lnRef idx="1">
+              <a:schemeClr val="accent1"/>
+            </a:lnRef>
+            <a:fillRef idx="0">
+              <a:schemeClr val="accent1"/>
+            </a:fillRef>
+            <a:effectRef idx="0">
+              <a:schemeClr val="accent1"/>
+            </a:effectRef>
+            <a:fontRef idx="minor">
+              <a:schemeClr val="tx1"/>
+            </a:fontRef>
+          </p:style>
+        </p:cxnSp>
+        <p:sp>
+          <p:nvSpPr>
+            <p:cNvPr id="16" name="TextBox 15"/>
+            <p:cNvSpPr txBox="1"/>
+            <p:nvPr/>
+          </p:nvSpPr>
+          <p:spPr>
+            <a:xfrm>
+              <a:off x="3432613" y="2461556"/>
+              <a:ext cx="1655518" cy="646331"/>
+            </a:xfrm>
+            <a:prstGeom prst="rect">
+              <a:avLst/>
+            </a:prstGeom>
+            <a:noFill/>
+          </p:spPr>
+          <p:txBody>
+            <a:bodyPr wrap="none" rtlCol="0">
+              <a:spAutoFit/>
+            </a:bodyPr>
+            <a:lstStyle/>
+            <a:p>
+              <a:pPr algn="ctr"/>
+              <a:r>
+                <a:rPr lang="en-US" dirty="0" smtClean="0">
+                  <a:solidFill>
+                    <a:schemeClr val="accent1">
+                      <a:lumMod val="75000"/>
+                    </a:schemeClr>
+                  </a:solidFill>
+                </a:rPr>
+                <a:t>Alphabet</a:t>
+              </a:r>
+              <a:r>
+                <a:rPr lang="en-US" dirty="0" smtClean="0"/>
+                <a:t> </a:t>
+              </a:r>
+            </a:p>
+            <a:p>
+              <a:pPr algn="ctr"/>
+              <a:r>
+                <a:rPr lang="en-US" dirty="0" smtClean="0"/>
+                <a:t>in a residue site</a:t>
+              </a:r>
+              <a:endParaRPr lang="en-US" dirty="0"/>
+            </a:p>
+          </p:txBody>
+        </p:sp>
+      </p:grpSp>
+      <p:grpSp>
+        <p:nvGrpSpPr>
+          <p:cNvPr id="45" name="Group 44"/>
+          <p:cNvGrpSpPr/>
+          <p:nvPr/>
+        </p:nvGrpSpPr>
+        <p:grpSpPr>
+          <a:xfrm>
+            <a:off x="769969" y="722164"/>
+            <a:ext cx="4803753" cy="5452697"/>
+            <a:chOff x="253324" y="464629"/>
+            <a:chExt cx="4803753" cy="5452697"/>
+          </a:xfrm>
+        </p:grpSpPr>
+        <p:pic>
+          <p:nvPicPr>
+            <p:cNvPr id="18" name="Picture 17"/>
+            <p:cNvPicPr>
+              <a:picLocks noChangeAspect="1"/>
+            </p:cNvPicPr>
+            <p:nvPr/>
+          </p:nvPicPr>
+          <p:blipFill rotWithShape="1">
+            <a:blip r:embed="rId3"/>
+            <a:srcRect r="14965"/>
+            <a:stretch/>
+          </p:blipFill>
+          <p:spPr>
+            <a:xfrm>
+              <a:off x="973806" y="1932303"/>
+              <a:ext cx="892276" cy="3370043"/>
+            </a:xfrm>
+            <a:prstGeom prst="rect">
+              <a:avLst/>
+            </a:prstGeom>
+            <a:ln>
+              <a:solidFill>
+                <a:schemeClr val="tx1"/>
+              </a:solidFill>
+            </a:ln>
+          </p:spPr>
+        </p:pic>
+        <p:cxnSp>
+          <p:nvCxnSpPr>
+            <p:cNvPr id="20" name="Straight Arrow Connector 19"/>
+            <p:cNvCxnSpPr/>
+            <p:nvPr/>
+          </p:nvCxnSpPr>
+          <p:spPr>
+            <a:xfrm>
+              <a:off x="498763" y="1932303"/>
+              <a:ext cx="387928" cy="0"/>
+            </a:xfrm>
+            <a:prstGeom prst="straightConnector1">
+              <a:avLst/>
+            </a:prstGeom>
+            <a:ln>
+              <a:solidFill>
+                <a:srgbClr val="FF0000"/>
+              </a:solidFill>
+              <a:tailEnd type="triangle"/>
+            </a:ln>
+          </p:spPr>
+          <p:style>
+            <a:lnRef idx="1">
+              <a:schemeClr val="accent1"/>
+            </a:lnRef>
+            <a:fillRef idx="0">
+              <a:schemeClr val="accent1"/>
+            </a:fillRef>
+            <a:effectRef idx="0">
+              <a:schemeClr val="accent1"/>
+            </a:effectRef>
+            <a:fontRef idx="minor">
+              <a:schemeClr val="tx1"/>
+            </a:fontRef>
+          </p:style>
+        </p:cxnSp>
+        <p:cxnSp>
+          <p:nvCxnSpPr>
+            <p:cNvPr id="21" name="Straight Arrow Connector 20"/>
+            <p:cNvCxnSpPr/>
+            <p:nvPr/>
+          </p:nvCxnSpPr>
+          <p:spPr>
+            <a:xfrm>
+              <a:off x="973806" y="1442712"/>
+              <a:ext cx="0" cy="444492"/>
+            </a:xfrm>
+            <a:prstGeom prst="straightConnector1">
+              <a:avLst/>
+            </a:prstGeom>
+            <a:ln>
+              <a:solidFill>
+                <a:srgbClr val="FF0000"/>
+              </a:solidFill>
+              <a:tailEnd type="triangle"/>
+            </a:ln>
+          </p:spPr>
+          <p:style>
+            <a:lnRef idx="1">
+              <a:schemeClr val="accent1"/>
+            </a:lnRef>
+            <a:fillRef idx="0">
+              <a:schemeClr val="accent1"/>
+            </a:fillRef>
+            <a:effectRef idx="0">
+              <a:schemeClr val="accent1"/>
+            </a:effectRef>
+            <a:fontRef idx="minor">
+              <a:schemeClr val="tx1"/>
+            </a:fontRef>
+          </p:style>
+        </p:cxnSp>
+        <p:sp>
+          <p:nvSpPr>
+            <p:cNvPr id="26" name="TextBox 25"/>
+            <p:cNvSpPr txBox="1"/>
+            <p:nvPr/>
+          </p:nvSpPr>
+          <p:spPr>
+            <a:xfrm>
+              <a:off x="1302010" y="464629"/>
+              <a:ext cx="3755067" cy="1200329"/>
+            </a:xfrm>
+            <a:prstGeom prst="rect">
+              <a:avLst/>
+            </a:prstGeom>
+            <a:noFill/>
+          </p:spPr>
+          <p:txBody>
+            <a:bodyPr wrap="none" rtlCol="0">
+              <a:spAutoFit/>
+            </a:bodyPr>
+            <a:lstStyle/>
+            <a:p>
+              <a:r>
+                <a:rPr lang="en-US" dirty="0" err="1"/>
+                <a:t>gdi.Gr_Device.DrawImage</a:t>
+              </a:r>
+              <a:r>
+                <a:rPr lang="en-US" dirty="0" smtClean="0"/>
+                <a:t>(</a:t>
+              </a:r>
+            </a:p>
+            <a:p>
+              <a:r>
+                <a:rPr lang="en-US" dirty="0"/>
+                <a:t> </a:t>
+              </a:r>
+              <a:r>
+                <a:rPr lang="en-US" dirty="0" smtClean="0"/>
+                <a:t>     </a:t>
+              </a:r>
+              <a:r>
+                <a:rPr lang="en-US" dirty="0" err="1" smtClean="0"/>
+                <a:t>ColorSchema</a:t>
+              </a:r>
+              <a:r>
+                <a:rPr lang="en-US" dirty="0" smtClean="0"/>
+                <a:t>(</a:t>
+              </a:r>
+              <a:r>
+                <a:rPr lang="en-US" dirty="0" err="1" smtClean="0"/>
+                <a:t>Alphabet.Alphabet</a:t>
+              </a:r>
+              <a:r>
+                <a:rPr lang="en-US" dirty="0"/>
+                <a:t>), </a:t>
+              </a:r>
+              <a:endParaRPr lang="en-US" dirty="0" smtClean="0"/>
+            </a:p>
+            <a:p>
+              <a:r>
+                <a:rPr lang="en-US" dirty="0"/>
+                <a:t> </a:t>
+              </a:r>
+              <a:r>
+                <a:rPr lang="en-US" dirty="0" smtClean="0"/>
+                <a:t>     </a:t>
+              </a:r>
+              <a:r>
+                <a:rPr lang="en-US" dirty="0" err="1" smtClean="0"/>
+                <a:t>CSng</a:t>
+              </a:r>
+              <a:r>
+                <a:rPr lang="en-US" dirty="0" smtClean="0"/>
+                <a:t>(X</a:t>
+              </a:r>
+              <a:r>
+                <a:rPr lang="en-US" dirty="0"/>
+                <a:t>), </a:t>
+              </a:r>
+              <a:r>
+                <a:rPr lang="en-US" dirty="0" err="1"/>
+                <a:t>CSng</a:t>
+              </a:r>
+              <a:r>
+                <a:rPr lang="en-US" dirty="0"/>
+                <a:t>(Y), </a:t>
+              </a:r>
+              <a:endParaRPr lang="en-US" dirty="0" smtClean="0"/>
+            </a:p>
+            <a:p>
+              <a:r>
+                <a:rPr lang="en-US" dirty="0"/>
+                <a:t> </a:t>
+              </a:r>
+              <a:r>
+                <a:rPr lang="en-US" dirty="0" smtClean="0"/>
+                <a:t>     </a:t>
+              </a:r>
+              <a:r>
+                <a:rPr lang="en-US" dirty="0" err="1" smtClean="0"/>
+                <a:t>CSng</a:t>
+              </a:r>
+              <a:r>
+                <a:rPr lang="en-US" dirty="0" smtClean="0"/>
+                <a:t>(</a:t>
+              </a:r>
+              <a:r>
+                <a:rPr lang="en-US" dirty="0" err="1" smtClean="0"/>
+                <a:t>DrawingDevice.WordSize</a:t>
+              </a:r>
+              <a:r>
+                <a:rPr lang="en-US" dirty="0"/>
+                <a:t>), H)</a:t>
+              </a:r>
+              <a:endParaRPr lang="en-US" dirty="0"/>
+            </a:p>
+          </p:txBody>
+        </p:sp>
+        <p:sp>
+          <p:nvSpPr>
+            <p:cNvPr id="33" name="TextBox 32"/>
+            <p:cNvSpPr txBox="1"/>
+            <p:nvPr/>
+          </p:nvSpPr>
+          <p:spPr>
+            <a:xfrm>
+              <a:off x="253324" y="1747637"/>
+              <a:ext cx="311304" cy="369332"/>
+            </a:xfrm>
+            <a:prstGeom prst="rect">
+              <a:avLst/>
+            </a:prstGeom>
+            <a:noFill/>
+          </p:spPr>
+          <p:txBody>
+            <a:bodyPr wrap="none" rtlCol="0">
+              <a:spAutoFit/>
+            </a:bodyPr>
+            <a:lstStyle/>
+            <a:p>
+              <a:r>
+                <a:rPr lang="en-US" altLang="zh-CN" b="1" dirty="0" smtClean="0"/>
+                <a:t>X</a:t>
+              </a:r>
+              <a:endParaRPr lang="en-US" b="1" dirty="0"/>
+            </a:p>
+          </p:txBody>
+        </p:sp>
+        <p:sp>
+          <p:nvSpPr>
+            <p:cNvPr id="34" name="TextBox 33"/>
+            <p:cNvSpPr txBox="1"/>
+            <p:nvPr/>
+          </p:nvSpPr>
+          <p:spPr>
+            <a:xfrm>
+              <a:off x="805896" y="1073380"/>
+              <a:ext cx="304892" cy="369332"/>
+            </a:xfrm>
+            <a:prstGeom prst="rect">
+              <a:avLst/>
+            </a:prstGeom>
+            <a:noFill/>
+          </p:spPr>
+          <p:txBody>
+            <a:bodyPr wrap="none" rtlCol="0">
+              <a:spAutoFit/>
+            </a:bodyPr>
+            <a:lstStyle/>
+            <a:p>
+              <a:r>
+                <a:rPr lang="en-US" b="1" dirty="0" smtClean="0"/>
+                <a:t>Y</a:t>
+              </a:r>
+              <a:endParaRPr lang="en-US" b="1" dirty="0"/>
+            </a:p>
+          </p:txBody>
+        </p:sp>
+        <p:cxnSp>
+          <p:nvCxnSpPr>
+            <p:cNvPr id="35" name="Straight Arrow Connector 34"/>
+            <p:cNvCxnSpPr/>
+            <p:nvPr/>
+          </p:nvCxnSpPr>
+          <p:spPr>
+            <a:xfrm flipV="1">
+              <a:off x="973806" y="5421909"/>
+              <a:ext cx="889222" cy="6522"/>
+            </a:xfrm>
+            <a:prstGeom prst="straightConnector1">
+              <a:avLst/>
+            </a:prstGeom>
+            <a:ln>
+              <a:solidFill>
+                <a:srgbClr val="FF0000"/>
+              </a:solidFill>
+              <a:tailEnd type="triangle"/>
+            </a:ln>
+          </p:spPr>
+          <p:style>
+            <a:lnRef idx="1">
+              <a:schemeClr val="accent1"/>
+            </a:lnRef>
+            <a:fillRef idx="0">
+              <a:schemeClr val="accent1"/>
+            </a:fillRef>
+            <a:effectRef idx="0">
+              <a:schemeClr val="accent1"/>
+            </a:effectRef>
+            <a:fontRef idx="minor">
+              <a:schemeClr val="tx1"/>
+            </a:fontRef>
+          </p:style>
+        </p:cxnSp>
+        <p:cxnSp>
+          <p:nvCxnSpPr>
+            <p:cNvPr id="38" name="Straight Arrow Connector 37"/>
+            <p:cNvCxnSpPr/>
+            <p:nvPr/>
+          </p:nvCxnSpPr>
+          <p:spPr>
+            <a:xfrm flipH="1" flipV="1">
+              <a:off x="2000009" y="1932303"/>
+              <a:ext cx="4283" cy="3370043"/>
+            </a:xfrm>
+            <a:prstGeom prst="straightConnector1">
+              <a:avLst/>
+            </a:prstGeom>
+            <a:ln>
+              <a:solidFill>
+                <a:srgbClr val="FF0000"/>
+              </a:solidFill>
+              <a:tailEnd type="triangle"/>
+            </a:ln>
+          </p:spPr>
+          <p:style>
+            <a:lnRef idx="1">
+              <a:schemeClr val="accent1"/>
+            </a:lnRef>
+            <a:fillRef idx="0">
+              <a:schemeClr val="accent1"/>
+            </a:fillRef>
+            <a:effectRef idx="0">
+              <a:schemeClr val="accent1"/>
+            </a:effectRef>
+            <a:fontRef idx="minor">
+              <a:schemeClr val="tx1"/>
+            </a:fontRef>
+          </p:style>
+        </p:cxnSp>
+        <p:sp>
+          <p:nvSpPr>
+            <p:cNvPr id="42" name="TextBox 41"/>
+            <p:cNvSpPr txBox="1"/>
+            <p:nvPr/>
+          </p:nvSpPr>
+          <p:spPr>
+            <a:xfrm>
+              <a:off x="805896" y="5547994"/>
+              <a:ext cx="2505751" cy="369332"/>
+            </a:xfrm>
+            <a:prstGeom prst="rect">
+              <a:avLst/>
+            </a:prstGeom>
+            <a:noFill/>
+          </p:spPr>
+          <p:txBody>
+            <a:bodyPr wrap="none" rtlCol="0">
+              <a:spAutoFit/>
+            </a:bodyPr>
+            <a:lstStyle/>
+            <a:p>
+              <a:r>
+                <a:rPr lang="en-US" dirty="0" err="1"/>
+                <a:t>DrawingDevice.WordSize</a:t>
+              </a:r>
+              <a:endParaRPr lang="en-US" dirty="0"/>
+            </a:p>
+          </p:txBody>
+        </p:sp>
+        <p:sp>
+          <p:nvSpPr>
+            <p:cNvPr id="43" name="TextBox 42"/>
+            <p:cNvSpPr txBox="1"/>
+            <p:nvPr/>
+          </p:nvSpPr>
+          <p:spPr>
+            <a:xfrm>
+              <a:off x="1973751" y="3448513"/>
+              <a:ext cx="328936" cy="369332"/>
+            </a:xfrm>
+            <a:prstGeom prst="rect">
+              <a:avLst/>
+            </a:prstGeom>
+            <a:noFill/>
+          </p:spPr>
+          <p:txBody>
+            <a:bodyPr wrap="none" rtlCol="0">
+              <a:spAutoFit/>
+            </a:bodyPr>
+            <a:lstStyle/>
+            <a:p>
+              <a:r>
+                <a:rPr lang="en-US" dirty="0" smtClean="0"/>
+                <a:t>H</a:t>
+              </a:r>
+              <a:endParaRPr lang="en-US" dirty="0"/>
+            </a:p>
+          </p:txBody>
+        </p:sp>
+        <mc:AlternateContent xmlns:mc="http://schemas.openxmlformats.org/markup-compatibility/2006">
+          <mc:Choice xmlns:a14="http://schemas.microsoft.com/office/drawing/2010/main" Requires="a14">
+            <p:sp>
+              <p:nvSpPr>
+                <p:cNvPr id="44" name="TextBox 43"/>
+                <p:cNvSpPr txBox="1"/>
+                <p:nvPr/>
+              </p:nvSpPr>
+              <p:spPr>
+                <a:xfrm>
+                  <a:off x="2411529" y="2582915"/>
+                  <a:ext cx="2331343" cy="276999"/>
+                </a:xfrm>
+                <a:prstGeom prst="rect">
+                  <a:avLst/>
+                </a:prstGeom>
+                <a:noFill/>
+              </p:spPr>
+              <p:txBody>
+                <a:bodyPr wrap="none" lIns="0" tIns="0" rIns="0" bIns="0" rtlCol="0">
+                  <a:spAutoFit/>
+                </a:bodyPr>
+                <a:lstStyle/>
+                <a:p>
+                  <a14:m>
+                    <m:oMathPara xmlns:m="http://schemas.openxmlformats.org/officeDocument/2006/math">
+                      <m:oMathParaPr>
+                        <m:jc m:val="centerGroup"/>
+                      </m:oMathParaPr>
+                      <m:oMath xmlns:m="http://schemas.openxmlformats.org/officeDocument/2006/math">
+                        <m:r>
+                          <a:rPr lang="en-US" b="0" i="1" smtClean="0">
+                            <a:latin typeface="Cambria Math" panose="02040503050406030204" pitchFamily="18" charset="0"/>
+                          </a:rPr>
+                          <m:t>h𝑒𝑖𝑔h𝑡</m:t>
+                        </m:r>
+                        <m:r>
+                          <a:rPr lang="en-US" i="1" smtClean="0">
+                            <a:latin typeface="Cambria Math" panose="02040503050406030204" pitchFamily="18" charset="0"/>
+                          </a:rPr>
+                          <m:t>=</m:t>
+                        </m:r>
+                        <m:sSub>
+                          <m:sSubPr>
+                            <m:ctrlPr>
+                              <a:rPr lang="en-US" i="1" smtClean="0">
+                                <a:latin typeface="Cambria Math" panose="02040503050406030204" pitchFamily="18" charset="0"/>
+                              </a:rPr>
+                            </m:ctrlPr>
+                          </m:sSubPr>
+                          <m:e>
+                            <m:r>
+                              <a:rPr lang="en-US" b="0" i="1" smtClean="0">
+                                <a:latin typeface="Cambria Math" panose="02040503050406030204" pitchFamily="18" charset="0"/>
+                              </a:rPr>
+                              <m:t>𝑓</m:t>
+                            </m:r>
+                            <m:d>
+                              <m:dPr>
+                                <m:ctrlPr>
+                                  <a:rPr lang="en-US" b="0" i="1" smtClean="0">
+                                    <a:latin typeface="Cambria Math" panose="02040503050406030204" pitchFamily="18" charset="0"/>
+                                  </a:rPr>
+                                </m:ctrlPr>
+                              </m:dPr>
+                              <m:e>
+                                <m:r>
+                                  <a:rPr lang="en-US" b="0" i="1" smtClean="0">
+                                    <a:latin typeface="Cambria Math" panose="02040503050406030204" pitchFamily="18" charset="0"/>
+                                  </a:rPr>
+                                  <m:t>𝑎</m:t>
+                                </m:r>
+                              </m:e>
+                            </m:d>
+                          </m:e>
+                          <m:sub>
+                            <m:r>
+                              <a:rPr lang="en-US" b="0" i="1" smtClean="0">
+                                <a:latin typeface="Cambria Math" panose="02040503050406030204" pitchFamily="18" charset="0"/>
+                              </a:rPr>
+                              <m:t>𝑖</m:t>
+                            </m:r>
+                          </m:sub>
+                        </m:sSub>
+                        <m:r>
+                          <a:rPr lang="en-US" i="1" smtClean="0">
+                            <a:latin typeface="Cambria Math" panose="02040503050406030204" pitchFamily="18" charset="0"/>
+                            <a:ea typeface="Cambria Math" panose="02040503050406030204" pitchFamily="18" charset="0"/>
+                          </a:rPr>
+                          <m:t>×</m:t>
+                        </m:r>
+                        <m:sSub>
+                          <m:sSubPr>
+                            <m:ctrlPr>
+                              <a:rPr lang="en-US" i="1" smtClean="0">
+                                <a:latin typeface="Cambria Math" panose="02040503050406030204" pitchFamily="18" charset="0"/>
+                                <a:ea typeface="Cambria Math" panose="02040503050406030204" pitchFamily="18" charset="0"/>
+                              </a:rPr>
+                            </m:ctrlPr>
+                          </m:sSubPr>
+                          <m:e>
+                            <m:r>
+                              <a:rPr lang="en-US" b="0" i="1" smtClean="0">
+                                <a:latin typeface="Cambria Math" panose="02040503050406030204" pitchFamily="18" charset="0"/>
+                                <a:ea typeface="Cambria Math" panose="02040503050406030204" pitchFamily="18" charset="0"/>
+                              </a:rPr>
+                              <m:t>𝐵𝑖𝑡𝑠</m:t>
+                            </m:r>
+                          </m:e>
+                          <m:sub>
+                            <m:r>
+                              <a:rPr lang="en-US" b="0" i="1" smtClean="0">
+                                <a:latin typeface="Cambria Math" panose="02040503050406030204" pitchFamily="18" charset="0"/>
+                                <a:ea typeface="Cambria Math" panose="02040503050406030204" pitchFamily="18" charset="0"/>
+                              </a:rPr>
+                              <m:t>𝑖</m:t>
+                            </m:r>
+                          </m:sub>
+                        </m:sSub>
+                      </m:oMath>
+                    </m:oMathPara>
+                  </a14:m>
+                  <a:endParaRPr lang="en-US" dirty="0"/>
+                </a:p>
+              </p:txBody>
+            </p:sp>
+          </mc:Choice>
+          <mc:Fallback>
+            <p:sp>
+              <p:nvSpPr>
+                <p:cNvPr id="44" name="TextBox 43"/>
+                <p:cNvSpPr txBox="1">
+                  <a:spLocks noRot="1" noChangeAspect="1" noMove="1" noResize="1" noEditPoints="1" noAdjustHandles="1" noChangeArrowheads="1" noChangeShapeType="1" noTextEdit="1"/>
+                </p:cNvSpPr>
+                <p:nvPr/>
+              </p:nvSpPr>
+              <p:spPr>
+                <a:xfrm>
+                  <a:off x="2411529" y="2582915"/>
+                  <a:ext cx="2331343" cy="276999"/>
+                </a:xfrm>
+                <a:prstGeom prst="rect">
+                  <a:avLst/>
+                </a:prstGeom>
+                <a:blipFill>
+                  <a:blip r:embed="rId4"/>
+                  <a:stretch>
+                    <a:fillRect l="-3133" t="-2222" r="-783" b="-35556"/>
+                  </a:stretch>
+                </a:blipFill>
+              </p:spPr>
+              <p:txBody>
+                <a:bodyPr/>
+                <a:lstStyle/>
+                <a:p>
+                  <a:r>
+                    <a:rPr lang="en-US">
+                      <a:noFill/>
+                    </a:rPr>
+                    <a:t> </a:t>
+                  </a:r>
+                </a:p>
+              </p:txBody>
+            </p:sp>
+          </mc:Fallback>
+        </mc:AlternateContent>
+      </p:grpSp>
+      <mc:AlternateContent xmlns:mc="http://schemas.openxmlformats.org/markup-compatibility/2006">
+        <mc:Choice xmlns:a14="http://schemas.microsoft.com/office/drawing/2010/main" Requires="a14">
+          <p:sp>
+            <p:nvSpPr>
+              <p:cNvPr id="46" name="TextBox 45"/>
+              <p:cNvSpPr txBox="1"/>
+              <p:nvPr/>
+            </p:nvSpPr>
+            <p:spPr>
+              <a:xfrm>
+                <a:off x="6456633" y="583664"/>
+                <a:ext cx="2331343" cy="276999"/>
+              </a:xfrm>
+              <a:prstGeom prst="rect">
+                <a:avLst/>
+              </a:prstGeom>
+              <a:noFill/>
+            </p:spPr>
+            <p:txBody>
+              <a:bodyPr wrap="none" lIns="0" tIns="0" rIns="0" bIns="0" rtlCol="0">
+                <a:spAutoFit/>
+              </a:bodyPr>
+              <a:lstStyle/>
+              <a:p>
+                <a14:m>
+                  <m:oMathPara xmlns:m="http://schemas.openxmlformats.org/officeDocument/2006/math">
+                    <m:oMathParaPr>
+                      <m:jc m:val="centerGroup"/>
+                    </m:oMathParaPr>
+                    <m:oMath xmlns:m="http://schemas.openxmlformats.org/officeDocument/2006/math">
+                      <m:r>
+                        <a:rPr lang="en-US" b="0" i="1" smtClean="0">
+                          <a:latin typeface="Cambria Math" panose="02040503050406030204" pitchFamily="18" charset="0"/>
+                        </a:rPr>
+                        <m:t>h𝑒𝑖𝑔h𝑡</m:t>
+                      </m:r>
+                      <m:r>
+                        <a:rPr lang="en-US" i="1" smtClean="0">
+                          <a:latin typeface="Cambria Math" panose="02040503050406030204" pitchFamily="18" charset="0"/>
+                        </a:rPr>
+                        <m:t>=</m:t>
+                      </m:r>
+                      <m:sSub>
+                        <m:sSubPr>
+                          <m:ctrlPr>
+                            <a:rPr lang="en-US" i="1" smtClean="0">
+                              <a:latin typeface="Cambria Math" panose="02040503050406030204" pitchFamily="18" charset="0"/>
+                            </a:rPr>
+                          </m:ctrlPr>
+                        </m:sSubPr>
+                        <m:e>
+                          <m:r>
+                            <a:rPr lang="en-US" b="0" i="1" smtClean="0">
+                              <a:latin typeface="Cambria Math" panose="02040503050406030204" pitchFamily="18" charset="0"/>
+                            </a:rPr>
+                            <m:t>𝑓</m:t>
+                          </m:r>
+                          <m:d>
+                            <m:dPr>
+                              <m:ctrlPr>
+                                <a:rPr lang="en-US" b="0" i="1" smtClean="0">
+                                  <a:latin typeface="Cambria Math" panose="02040503050406030204" pitchFamily="18" charset="0"/>
+                                </a:rPr>
+                              </m:ctrlPr>
+                            </m:dPr>
+                            <m:e>
+                              <m:r>
+                                <a:rPr lang="en-US" b="0" i="1" smtClean="0">
+                                  <a:latin typeface="Cambria Math" panose="02040503050406030204" pitchFamily="18" charset="0"/>
+                                </a:rPr>
+                                <m:t>𝑎</m:t>
+                              </m:r>
+                            </m:e>
+                          </m:d>
+                        </m:e>
+                        <m:sub>
+                          <m:r>
+                            <a:rPr lang="en-US" b="0" i="1" smtClean="0">
+                              <a:latin typeface="Cambria Math" panose="02040503050406030204" pitchFamily="18" charset="0"/>
+                            </a:rPr>
+                            <m:t>𝑖</m:t>
+                          </m:r>
+                        </m:sub>
+                      </m:sSub>
+                      <m:r>
+                        <a:rPr lang="en-US" i="1" smtClean="0">
+                          <a:latin typeface="Cambria Math" panose="02040503050406030204" pitchFamily="18" charset="0"/>
+                          <a:ea typeface="Cambria Math" panose="02040503050406030204" pitchFamily="18" charset="0"/>
+                        </a:rPr>
+                        <m:t>×</m:t>
+                      </m:r>
+                      <m:sSub>
+                        <m:sSubPr>
+                          <m:ctrlPr>
+                            <a:rPr lang="en-US" i="1" smtClean="0">
+                              <a:latin typeface="Cambria Math" panose="02040503050406030204" pitchFamily="18" charset="0"/>
+                              <a:ea typeface="Cambria Math" panose="02040503050406030204" pitchFamily="18" charset="0"/>
+                            </a:rPr>
+                          </m:ctrlPr>
+                        </m:sSubPr>
+                        <m:e>
+                          <m:r>
+                            <a:rPr lang="en-US" b="0" i="1" smtClean="0">
+                              <a:latin typeface="Cambria Math" panose="02040503050406030204" pitchFamily="18" charset="0"/>
+                              <a:ea typeface="Cambria Math" panose="02040503050406030204" pitchFamily="18" charset="0"/>
+                            </a:rPr>
+                            <m:t>𝐵𝑖𝑡𝑠</m:t>
+                          </m:r>
+                        </m:e>
+                        <m:sub>
+                          <m:r>
+                            <a:rPr lang="en-US" b="0" i="1" smtClean="0">
+                              <a:latin typeface="Cambria Math" panose="02040503050406030204" pitchFamily="18" charset="0"/>
+                              <a:ea typeface="Cambria Math" panose="02040503050406030204" pitchFamily="18" charset="0"/>
+                            </a:rPr>
+                            <m:t>𝑖</m:t>
+                          </m:r>
+                        </m:sub>
+                      </m:sSub>
+                    </m:oMath>
+                  </m:oMathPara>
+                </a14:m>
+                <a:endParaRPr lang="en-US" dirty="0"/>
+              </a:p>
+            </p:txBody>
+          </p:sp>
+        </mc:Choice>
+        <mc:Fallback>
+          <p:sp>
+            <p:nvSpPr>
+              <p:cNvPr id="46" name="TextBox 45"/>
+              <p:cNvSpPr txBox="1">
+                <a:spLocks noRot="1" noChangeAspect="1" noMove="1" noResize="1" noEditPoints="1" noAdjustHandles="1" noChangeArrowheads="1" noChangeShapeType="1" noTextEdit="1"/>
+              </p:cNvSpPr>
+              <p:nvPr/>
+            </p:nvSpPr>
+            <p:spPr>
+              <a:xfrm>
+                <a:off x="6456633" y="583664"/>
+                <a:ext cx="2331343" cy="276999"/>
+              </a:xfrm>
+              <a:prstGeom prst="rect">
+                <a:avLst/>
+              </a:prstGeom>
+              <a:blipFill>
+                <a:blip r:embed="rId5"/>
+                <a:stretch>
+                  <a:fillRect l="-3133" t="-4444" r="-783" b="-35556"/>
+                </a:stretch>
+              </a:blipFill>
+            </p:spPr>
+            <p:txBody>
+              <a:bodyPr/>
+              <a:lstStyle/>
+              <a:p>
+                <a:r>
+                  <a:rPr lang="en-US">
+                    <a:noFill/>
+                  </a:rPr>
+                  <a:t> </a:t>
+                </a:r>
+              </a:p>
+            </p:txBody>
+          </p:sp>
+        </mc:Fallback>
+      </mc:AlternateContent>
+    </p:spTree>
+    <p:extLst>
+      <p:ext uri="{BB962C8B-B14F-4D97-AF65-F5344CB8AC3E}">
+        <p14:creationId xmlns:p14="http://schemas.microsoft.com/office/powerpoint/2010/main" val="3958615698"/>
       </p:ext>
     </p:extLst>
   </p:cSld>

</xml_diff>